<commit_message>
changes made to final proj presentation -- added content for petre and yongxu - kina
</commit_message>
<xml_diff>
--- a/FinalProjPresentation.pptx
+++ b/FinalProjPresentation.pptx
@@ -9465,13 +9465,98 @@
           <a:p>
             <a:pPr lvl="1"/>
             <a:r>
+              <a:rPr lang="en-US" dirty="0" smtClean="0"/>
+              <a:t>REST API uses </a:t>
+            </a:r>
+            <a:r>
               <a:rPr lang="en-US" dirty="0" err="1" smtClean="0"/>
-              <a:t>yongxu</a:t>
-            </a:r>
+              <a:t>Oauth</a:t>
+            </a:r>
+            <a:r>
+              <a:rPr lang="en-US" dirty="0" smtClean="0"/>
+              <a:t> API to make authorized GET requests</a:t>
+            </a:r>
+          </a:p>
+          <a:p>
+            <a:pPr lvl="1"/>
+            <a:r>
+              <a:rPr lang="en-US" dirty="0" smtClean="0"/>
+              <a:t>We power it using Google App Engine</a:t>
+            </a:r>
+          </a:p>
+          <a:p>
+            <a:pPr lvl="1"/>
+            <a:r>
+              <a:rPr lang="en-US" dirty="0" smtClean="0"/>
+              <a:t>Can retrieve any user’s home timeline, controlling</a:t>
+            </a:r>
+          </a:p>
+          <a:p>
+            <a:pPr lvl="2"/>
+            <a:r>
+              <a:rPr lang="en-US" dirty="0" smtClean="0"/>
+              <a:t>Count</a:t>
+            </a:r>
+          </a:p>
+          <a:p>
+            <a:pPr lvl="2"/>
+            <a:r>
+              <a:rPr lang="en-US" dirty="0" smtClean="0"/>
+              <a:t>Replies allowed</a:t>
+            </a:r>
+          </a:p>
+          <a:p>
+            <a:pPr lvl="2"/>
+            <a:r>
+              <a:rPr lang="en-US" dirty="0" smtClean="0"/>
+              <a:t>IDs returned</a:t>
+            </a:r>
+            <a:endParaRPr lang="en-US" dirty="0" smtClean="0"/>
+          </a:p>
+          <a:p>
+            <a:pPr lvl="2"/>
+            <a:endParaRPr lang="en-US" dirty="0" smtClean="0"/>
+          </a:p>
+          <a:p>
+            <a:pPr lvl="2"/>
+            <a:endParaRPr lang="en-US" dirty="0" smtClean="0"/>
+          </a:p>
+          <a:p>
+            <a:pPr lvl="1"/>
             <a:endParaRPr lang="en-US" dirty="0"/>
           </a:p>
         </p:txBody>
       </p:sp>
+      <p:pic>
+        <p:nvPicPr>
+          <p:cNvPr id="5" name="Picture 4" descr="Screen Shot 2012-12-20 at 3.20.11 PM.png"/>
+          <p:cNvPicPr>
+            <a:picLocks noChangeAspect="1"/>
+          </p:cNvPicPr>
+          <p:nvPr/>
+        </p:nvPicPr>
+        <p:blipFill>
+          <a:blip r:embed="rId4">
+            <a:extLst>
+              <a:ext uri="{28A0092B-C50C-407E-A947-70E740481C1C}">
+                <a14:useLocalDpi xmlns:a14="http://schemas.microsoft.com/office/drawing/2010/main" val="0"/>
+              </a:ext>
+            </a:extLst>
+          </a:blip>
+          <a:stretch>
+            <a:fillRect/>
+          </a:stretch>
+        </p:blipFill>
+        <p:spPr>
+          <a:xfrm>
+            <a:off x="954218" y="4583224"/>
+            <a:ext cx="4453564" cy="2405210"/>
+          </a:xfrm>
+          <a:prstGeom prst="rect">
+            <a:avLst/>
+          </a:prstGeom>
+        </p:spPr>
+      </p:pic>
     </p:spTree>
     <p:extLst>
       <p:ext uri="{BB962C8B-B14F-4D97-AF65-F5344CB8AC3E}">
@@ -9780,9 +9865,44 @@
           <a:p>
             <a:pPr lvl="1"/>
             <a:r>
+              <a:rPr lang="en-US" dirty="0" smtClean="0"/>
+              <a:t>Uses </a:t>
+            </a:r>
+            <a:r>
               <a:rPr lang="en-US" dirty="0" err="1" smtClean="0"/>
-              <a:t>petre</a:t>
-            </a:r>
+              <a:t>jQuery</a:t>
+            </a:r>
+            <a:r>
+              <a:rPr lang="en-US" dirty="0" smtClean="0"/>
+              <a:t> to create tooltip highlighting</a:t>
+            </a:r>
+          </a:p>
+          <a:p>
+            <a:pPr lvl="1"/>
+            <a:r>
+              <a:rPr lang="en-US" dirty="0" smtClean="0"/>
+              <a:t>Sends requests to the Cloud </a:t>
+            </a:r>
+          </a:p>
+          <a:p>
+            <a:pPr lvl="2"/>
+            <a:r>
+              <a:rPr lang="en-US" dirty="0" smtClean="0"/>
+              <a:t>Sends keywords and receives back tweets in </a:t>
+            </a:r>
+            <a:r>
+              <a:rPr lang="en-US" dirty="0" err="1" smtClean="0"/>
+              <a:t>json</a:t>
+            </a:r>
+            <a:r>
+              <a:rPr lang="en-US" smtClean="0"/>
+              <a:t> format</a:t>
+            </a:r>
+          </a:p>
+          <a:p>
+            <a:pPr marL="365760" lvl="1" indent="0">
+              <a:buNone/>
+            </a:pPr>
             <a:endParaRPr lang="en-US" dirty="0" smtClean="0"/>
           </a:p>
           <a:p>

</xml_diff>

<commit_message>
Modified the presentation and added link
</commit_message>
<xml_diff>
--- a/FinalProjPresentation.pptx
+++ b/FinalProjPresentation.pptx
@@ -117,7 +117,7 @@
   </p:defaultTextStyle>
   <p:extLst>
     <p:ext uri="{521415D9-36F7-43E2-AB2F-B90AF26B5E84}">
-      <p14:sectionLst xmlns="" xmlns:p14="http://schemas.microsoft.com/office/powerpoint/2010/main">
+      <p14:sectionLst xmlns:p14="http://schemas.microsoft.com/office/powerpoint/2010/main">
         <p14:section name="Default Section" id="{01AA4CE5-EF0B-F549-AD1B-E4D99B2E443B}">
           <p14:sldIdLst>
             <p14:sldId id="256"/>
@@ -130,7 +130,8 @@
             <p14:sldId id="260"/>
             <p14:sldId id="258"/>
             <p14:sldId id="262"/>
-            <p14:sldId id="263"/>
+            <p14:sldId id="267"/>
+            <p14:sldId id="268"/>
             <p14:sldId id="264"/>
             <p14:sldId id="265"/>
             <p14:sldId id="266"/>
@@ -376,7 +377,7 @@
     </p:spTree>
     <p:extLst>
       <p:ext uri="{BB962C8B-B14F-4D97-AF65-F5344CB8AC3E}">
-        <p14:creationId xmlns="" xmlns:p14="http://schemas.microsoft.com/office/powerpoint/2010/main" val="2652689859"/>
+        <p14:creationId xmlns:p14="http://schemas.microsoft.com/office/powerpoint/2010/main" val="2652689859"/>
       </p:ext>
     </p:extLst>
   </p:cSld>
@@ -548,7 +549,7 @@
     </p:spTree>
     <p:extLst>
       <p:ext uri="{BB962C8B-B14F-4D97-AF65-F5344CB8AC3E}">
-        <p14:creationId xmlns="" xmlns:p14="http://schemas.microsoft.com/office/powerpoint/2010/main" val="3191485533"/>
+        <p14:creationId xmlns:p14="http://schemas.microsoft.com/office/powerpoint/2010/main" val="3191485533"/>
       </p:ext>
     </p:extLst>
   </p:cSld>
@@ -730,7 +731,7 @@
     </p:spTree>
     <p:extLst>
       <p:ext uri="{BB962C8B-B14F-4D97-AF65-F5344CB8AC3E}">
-        <p14:creationId xmlns="" xmlns:p14="http://schemas.microsoft.com/office/powerpoint/2010/main" val="1920986561"/>
+        <p14:creationId xmlns:p14="http://schemas.microsoft.com/office/powerpoint/2010/main" val="1920986561"/>
       </p:ext>
     </p:extLst>
   </p:cSld>
@@ -1444,7 +1445,7 @@
             <a:alphaModFix amt="45000"/>
             <a:extLst>
               <a:ext uri="{BEBA8EAE-BF5A-486C-A8C5-ECC9F3942E4B}">
-                <a14:imgProps xmlns="" xmlns:a14="http://schemas.microsoft.com/office/drawing/2010/main">
+                <a14:imgProps xmlns:a14="http://schemas.microsoft.com/office/drawing/2010/main">
                   <a14:imgLayer r:embed="rId3">
                     <a14:imgEffect>
                       <a14:backgroundRemoval t="677" b="95937" l="0" r="98667">
@@ -1484,7 +1485,7 @@
             <a:alphaModFix amt="43000"/>
             <a:extLst>
               <a:ext uri="{BEBA8EAE-BF5A-486C-A8C5-ECC9F3942E4B}">
-                <a14:imgProps xmlns="" xmlns:a14="http://schemas.microsoft.com/office/drawing/2010/main">
+                <a14:imgProps xmlns:a14="http://schemas.microsoft.com/office/drawing/2010/main">
                   <a14:imgLayer r:embed="rId5">
                     <a14:imgEffect>
                       <a14:backgroundRemoval t="10000" b="90000" l="10000" r="90000"/>
@@ -3439,7 +3440,7 @@
     </p:spTree>
     <p:extLst>
       <p:ext uri="{BB962C8B-B14F-4D97-AF65-F5344CB8AC3E}">
-        <p14:creationId xmlns="" xmlns:p14="http://schemas.microsoft.com/office/powerpoint/2010/main" val="185357461"/>
+        <p14:creationId xmlns:p14="http://schemas.microsoft.com/office/powerpoint/2010/main" val="185357461"/>
       </p:ext>
     </p:extLst>
   </p:cSld>
@@ -4613,7 +4614,7 @@
     </p:spTree>
     <p:extLst>
       <p:ext uri="{BB962C8B-B14F-4D97-AF65-F5344CB8AC3E}">
-        <p14:creationId xmlns="" xmlns:p14="http://schemas.microsoft.com/office/powerpoint/2010/main" val="3137665293"/>
+        <p14:creationId xmlns:p14="http://schemas.microsoft.com/office/powerpoint/2010/main" val="3137665293"/>
       </p:ext>
     </p:extLst>
   </p:cSld>
@@ -4903,7 +4904,7 @@
     </p:spTree>
     <p:extLst>
       <p:ext uri="{BB962C8B-B14F-4D97-AF65-F5344CB8AC3E}">
-        <p14:creationId xmlns="" xmlns:p14="http://schemas.microsoft.com/office/powerpoint/2010/main" val="755437161"/>
+        <p14:creationId xmlns:p14="http://schemas.microsoft.com/office/powerpoint/2010/main" val="755437161"/>
       </p:ext>
     </p:extLst>
   </p:cSld>
@@ -5327,7 +5328,7 @@
     </p:spTree>
     <p:extLst>
       <p:ext uri="{BB962C8B-B14F-4D97-AF65-F5344CB8AC3E}">
-        <p14:creationId xmlns="" xmlns:p14="http://schemas.microsoft.com/office/powerpoint/2010/main" val="2464715175"/>
+        <p14:creationId xmlns:p14="http://schemas.microsoft.com/office/powerpoint/2010/main" val="2464715175"/>
       </p:ext>
     </p:extLst>
   </p:cSld>
@@ -5447,7 +5448,7 @@
     </p:spTree>
     <p:extLst>
       <p:ext uri="{BB962C8B-B14F-4D97-AF65-F5344CB8AC3E}">
-        <p14:creationId xmlns="" xmlns:p14="http://schemas.microsoft.com/office/powerpoint/2010/main" val="1377667079"/>
+        <p14:creationId xmlns:p14="http://schemas.microsoft.com/office/powerpoint/2010/main" val="1377667079"/>
       </p:ext>
     </p:extLst>
   </p:cSld>
@@ -5544,7 +5545,7 @@
     </p:spTree>
     <p:extLst>
       <p:ext uri="{BB962C8B-B14F-4D97-AF65-F5344CB8AC3E}">
-        <p14:creationId xmlns="" xmlns:p14="http://schemas.microsoft.com/office/powerpoint/2010/main" val="4184464099"/>
+        <p14:creationId xmlns:p14="http://schemas.microsoft.com/office/powerpoint/2010/main" val="4184464099"/>
       </p:ext>
     </p:extLst>
   </p:cSld>
@@ -5823,7 +5824,7 @@
     </p:spTree>
     <p:extLst>
       <p:ext uri="{BB962C8B-B14F-4D97-AF65-F5344CB8AC3E}">
-        <p14:creationId xmlns="" xmlns:p14="http://schemas.microsoft.com/office/powerpoint/2010/main" val="2527544198"/>
+        <p14:creationId xmlns:p14="http://schemas.microsoft.com/office/powerpoint/2010/main" val="2527544198"/>
       </p:ext>
     </p:extLst>
   </p:cSld>
@@ -6078,7 +6079,7 @@
     </p:spTree>
     <p:extLst>
       <p:ext uri="{BB962C8B-B14F-4D97-AF65-F5344CB8AC3E}">
-        <p14:creationId xmlns="" xmlns:p14="http://schemas.microsoft.com/office/powerpoint/2010/main" val="4162057796"/>
+        <p14:creationId xmlns:p14="http://schemas.microsoft.com/office/powerpoint/2010/main" val="4162057796"/>
       </p:ext>
     </p:extLst>
   </p:cSld>
@@ -6329,7 +6330,7 @@
     </p:spTree>
     <p:extLst>
       <p:ext uri="{BB962C8B-B14F-4D97-AF65-F5344CB8AC3E}">
-        <p14:creationId xmlns="" xmlns:p14="http://schemas.microsoft.com/office/powerpoint/2010/main" val="3269474631"/>
+        <p14:creationId xmlns:p14="http://schemas.microsoft.com/office/powerpoint/2010/main" val="3269474631"/>
       </p:ext>
     </p:extLst>
   </p:cSld>
@@ -7888,7 +7889,7 @@
             <a:alphaModFix amt="43000"/>
             <a:extLst>
               <a:ext uri="{BEBA8EAE-BF5A-486C-A8C5-ECC9F3942E4B}">
-                <a14:imgProps xmlns="" xmlns:a14="http://schemas.microsoft.com/office/drawing/2010/main">
+                <a14:imgProps xmlns:a14="http://schemas.microsoft.com/office/drawing/2010/main">
                   <a14:imgLayer r:embed="rId3">
                     <a14:imgEffect>
                       <a14:backgroundRemoval t="10000" b="90000" l="10000" r="90000"/>
@@ -8122,7 +8123,7 @@
             <a:alphaModFix amt="45000"/>
             <a:extLst>
               <a:ext uri="{BEBA8EAE-BF5A-486C-A8C5-ECC9F3942E4B}">
-                <a14:imgProps xmlns="" xmlns:a14="http://schemas.microsoft.com/office/drawing/2010/main">
+                <a14:imgProps xmlns:a14="http://schemas.microsoft.com/office/drawing/2010/main">
                   <a14:imgLayer r:embed="rId5">
                     <a14:imgEffect>
                       <a14:backgroundRemoval t="677" b="95937" l="0" r="98667">
@@ -8152,7 +8153,7 @@
     </p:spTree>
     <p:extLst>
       <p:ext uri="{BB962C8B-B14F-4D97-AF65-F5344CB8AC3E}">
-        <p14:creationId xmlns="" xmlns:p14="http://schemas.microsoft.com/office/powerpoint/2010/main" val="2144517530"/>
+        <p14:creationId xmlns:p14="http://schemas.microsoft.com/office/powerpoint/2010/main" val="2144517530"/>
       </p:ext>
     </p:extLst>
   </p:cSld>
@@ -8243,40 +8244,65 @@
             <a:endParaRPr lang="en-US" dirty="0" smtClean="0"/>
           </a:p>
           <a:p>
+            <a:pPr marL="0" indent="0">
+              <a:buNone/>
+            </a:pPr>
+            <a:endParaRPr lang="en-US" dirty="0" smtClean="0"/>
+          </a:p>
+          <a:p>
             <a:pPr lvl="1"/>
             <a:r>
-              <a:rPr lang="en-US" dirty="0" smtClean="0"/>
-              <a:t>Uses </a:t>
-            </a:r>
-            <a:r>
-              <a:rPr lang="en-US" dirty="0" err="1" smtClean="0"/>
+              <a:rPr lang="en-US" dirty="0"/>
+              <a:t>Sends requests to the Cloud </a:t>
+            </a:r>
+          </a:p>
+          <a:p>
+            <a:pPr lvl="2"/>
+            <a:r>
+              <a:rPr lang="en-US" dirty="0"/>
+              <a:t>Sends the currently opened wiki page and receives back tweets in </a:t>
+            </a:r>
+            <a:r>
+              <a:rPr lang="en-US" dirty="0" err="1"/>
+              <a:t>json</a:t>
+            </a:r>
+            <a:r>
+              <a:rPr lang="en-US" dirty="0"/>
+              <a:t> format</a:t>
+            </a:r>
+          </a:p>
+          <a:p>
+            <a:pPr lvl="1"/>
+            <a:r>
+              <a:rPr lang="en-US" dirty="0" err="1"/>
               <a:t>jQuery</a:t>
             </a:r>
             <a:r>
-              <a:rPr lang="en-US" dirty="0" smtClean="0"/>
-              <a:t> to create tooltip highlighting</a:t>
+              <a:rPr lang="en-US" dirty="0"/>
+              <a:t> and </a:t>
+            </a:r>
+            <a:r>
+              <a:rPr lang="en-US" dirty="0" err="1"/>
+              <a:t>jQuery</a:t>
+            </a:r>
+            <a:r>
+              <a:rPr lang="en-US" dirty="0"/>
+              <a:t> plugins (</a:t>
+            </a:r>
+            <a:r>
+              <a:rPr lang="en-US" dirty="0" err="1"/>
+              <a:t>qTip</a:t>
+            </a:r>
+            <a:r>
+              <a:rPr lang="en-US" dirty="0"/>
+              <a:t> plugin) to highlight the keywords on the page and create the twitter popups</a:t>
             </a:r>
           </a:p>
           <a:p>
             <a:pPr lvl="1"/>
             <a:r>
-              <a:rPr lang="en-US" dirty="0" smtClean="0"/>
-              <a:t>Sends requests to the Cloud </a:t>
-            </a:r>
-          </a:p>
-          <a:p>
-            <a:pPr lvl="2"/>
-            <a:r>
-              <a:rPr lang="en-US" dirty="0" smtClean="0"/>
-              <a:t>Sends keywords and receives back tweets in </a:t>
-            </a:r>
-            <a:r>
-              <a:rPr lang="en-US" dirty="0" err="1" smtClean="0"/>
-              <a:t>json</a:t>
-            </a:r>
-            <a:r>
-              <a:rPr lang="en-US" smtClean="0"/>
-              <a:t> format</a:t>
+              <a:rPr lang="en-US" dirty="0"/>
+              <a:t>CSS3 to style the twitter feed on the page</a:t>
             </a:r>
           </a:p>
           <a:p>
@@ -8302,7 +8328,7 @@
           <a:blip r:embed="rId2">
             <a:extLst>
               <a:ext uri="{BEBA8EAE-BF5A-486C-A8C5-ECC9F3942E4B}">
-                <a14:imgProps xmlns="" xmlns:a14="http://schemas.microsoft.com/office/drawing/2010/main">
+                <a14:imgProps xmlns:a14="http://schemas.microsoft.com/office/drawing/2010/main">
                   <a14:imgLayer r:embed="rId3">
                     <a14:imgEffect>
                       <a14:backgroundRemoval t="4688" b="89941" l="10000" r="86563">
@@ -8331,7 +8357,7 @@
     </p:spTree>
     <p:extLst>
       <p:ext uri="{BB962C8B-B14F-4D97-AF65-F5344CB8AC3E}">
-        <p14:creationId xmlns="" xmlns:p14="http://schemas.microsoft.com/office/powerpoint/2010/main" val="3621912806"/>
+        <p14:creationId xmlns:p14="http://schemas.microsoft.com/office/powerpoint/2010/main" val="3621912806"/>
       </p:ext>
     </p:extLst>
   </p:cSld>
@@ -8400,7 +8426,7 @@
           <a:blip r:embed="rId2">
             <a:extLst>
               <a:ext uri="{BEBA8EAE-BF5A-486C-A8C5-ECC9F3942E4B}">
-                <a14:imgProps xmlns="" xmlns:a14="http://schemas.microsoft.com/office/drawing/2010/main">
+                <a14:imgProps xmlns:a14="http://schemas.microsoft.com/office/drawing/2010/main">
                   <a14:imgLayer r:embed="rId3">
                     <a14:imgEffect>
                       <a14:backgroundRemoval t="6272" b="91638" l="6000" r="57077">
@@ -8432,7 +8458,7 @@
     </p:spTree>
     <p:extLst>
       <p:ext uri="{BB962C8B-B14F-4D97-AF65-F5344CB8AC3E}">
-        <p14:creationId xmlns="" xmlns:p14="http://schemas.microsoft.com/office/powerpoint/2010/main" val="2323704991"/>
+        <p14:creationId xmlns:p14="http://schemas.microsoft.com/office/powerpoint/2010/main" val="2323704991"/>
       </p:ext>
     </p:extLst>
   </p:cSld>
@@ -8587,7 +8613,7 @@
           <a:blip r:embed="rId2">
             <a:extLst>
               <a:ext uri="{28A0092B-C50C-407E-A947-70E740481C1C}">
-                <a14:useLocalDpi xmlns="" xmlns:a14="http://schemas.microsoft.com/office/drawing/2010/main" val="0"/>
+                <a14:useLocalDpi xmlns:a14="http://schemas.microsoft.com/office/drawing/2010/main" val="0"/>
               </a:ext>
             </a:extLst>
           </a:blip>
@@ -8608,7 +8634,7 @@
     </p:spTree>
     <p:extLst>
       <p:ext uri="{BB962C8B-B14F-4D97-AF65-F5344CB8AC3E}">
-        <p14:creationId xmlns="" xmlns:p14="http://schemas.microsoft.com/office/powerpoint/2010/main" val="2369100358"/>
+        <p14:creationId xmlns:p14="http://schemas.microsoft.com/office/powerpoint/2010/main" val="2369100358"/>
       </p:ext>
     </p:extLst>
   </p:cSld>
@@ -8755,7 +8781,7 @@
           <a:blip r:embed="rId2">
             <a:extLst>
               <a:ext uri="{BEBA8EAE-BF5A-486C-A8C5-ECC9F3942E4B}">
-                <a14:imgProps xmlns="" xmlns:a14="http://schemas.microsoft.com/office/drawing/2010/main">
+                <a14:imgProps xmlns:a14="http://schemas.microsoft.com/office/drawing/2010/main">
                   <a14:imgLayer r:embed="rId3">
                     <a14:imgEffect>
                       <a14:backgroundRemoval t="1231" b="97538" l="2157" r="97451">
@@ -8792,7 +8818,7 @@
     </p:spTree>
     <p:extLst>
       <p:ext uri="{BB962C8B-B14F-4D97-AF65-F5344CB8AC3E}">
-        <p14:creationId xmlns="" xmlns:p14="http://schemas.microsoft.com/office/powerpoint/2010/main" val="4188604081"/>
+        <p14:creationId xmlns:p14="http://schemas.microsoft.com/office/powerpoint/2010/main" val="4188604081"/>
       </p:ext>
     </p:extLst>
   </p:cSld>
@@ -8926,7 +8952,7 @@
           <a:blip r:embed="rId2">
             <a:extLst>
               <a:ext uri="{28A0092B-C50C-407E-A947-70E740481C1C}">
-                <a14:useLocalDpi xmlns="" xmlns:a14="http://schemas.microsoft.com/office/drawing/2010/main" val="0"/>
+                <a14:useLocalDpi xmlns:a14="http://schemas.microsoft.com/office/drawing/2010/main" val="0"/>
               </a:ext>
             </a:extLst>
           </a:blip>
@@ -9246,7 +9272,7 @@
     </p:spTree>
     <p:extLst>
       <p:ext uri="{BB962C8B-B14F-4D97-AF65-F5344CB8AC3E}">
-        <p14:creationId xmlns="" xmlns:p14="http://schemas.microsoft.com/office/powerpoint/2010/main" val="420161913"/>
+        <p14:creationId xmlns:p14="http://schemas.microsoft.com/office/powerpoint/2010/main" val="420161913"/>
       </p:ext>
     </p:extLst>
   </p:cSld>
@@ -9387,7 +9413,7 @@
           <a:blip r:embed="rId2">
             <a:extLst>
               <a:ext uri="{BEBA8EAE-BF5A-486C-A8C5-ECC9F3942E4B}">
-                <a14:imgProps xmlns="" xmlns:a14="http://schemas.microsoft.com/office/drawing/2010/main">
+                <a14:imgProps xmlns:a14="http://schemas.microsoft.com/office/drawing/2010/main">
                   <a14:imgLayer r:embed="rId3">
                     <a14:imgEffect>
                       <a14:backgroundRemoval t="4688" b="89941" l="10000" r="86563">
@@ -9416,7 +9442,7 @@
     </p:spTree>
     <p:extLst>
       <p:ext uri="{BB962C8B-B14F-4D97-AF65-F5344CB8AC3E}">
-        <p14:creationId xmlns="" xmlns:p14="http://schemas.microsoft.com/office/powerpoint/2010/main" val="208449360"/>
+        <p14:creationId xmlns:p14="http://schemas.microsoft.com/office/powerpoint/2010/main" val="208449360"/>
       </p:ext>
     </p:extLst>
   </p:cSld>
@@ -9495,11 +9521,7 @@
           <a:p>
             <a:r>
               <a:rPr lang="en-US" dirty="0" smtClean="0"/>
-              <a:t>Google App </a:t>
-            </a:r>
-            <a:r>
-              <a:rPr lang="en-US" dirty="0" smtClean="0"/>
-              <a:t>Engine (</a:t>
+              <a:t>Google App Engine (</a:t>
             </a:r>
             <a:r>
               <a:rPr lang="en-US" dirty="0" err="1" smtClean="0"/>
@@ -9509,29 +9531,19 @@
               <a:rPr lang="en-US" dirty="0" smtClean="0"/>
               <a:t>)</a:t>
             </a:r>
+          </a:p>
+          <a:p>
+            <a:r>
+              <a:rPr lang="en-US" altLang="zh-CN" dirty="0" smtClean="0"/>
+              <a:t>Amazon EC2 instance (Webpage and tweet analysis)</a:t>
+            </a:r>
             <a:endParaRPr lang="en-US" dirty="0" smtClean="0"/>
           </a:p>
           <a:p>
             <a:r>
-              <a:rPr lang="en-US" altLang="zh-CN" dirty="0" smtClean="0"/>
-              <a:t>Amazon EC2 </a:t>
-            </a:r>
-            <a:r>
-              <a:rPr lang="en-US" altLang="zh-CN" dirty="0" smtClean="0"/>
-              <a:t>instance (Webpage and tweet analysis)</a:t>
-            </a:r>
-            <a:endParaRPr lang="en-US" dirty="0" smtClean="0"/>
-          </a:p>
-          <a:p>
-            <a:r>
               <a:rPr lang="en-US" dirty="0" smtClean="0"/>
-              <a:t>Twitter REST </a:t>
-            </a:r>
-            <a:r>
-              <a:rPr lang="en-US" dirty="0" smtClean="0"/>
-              <a:t>API (Extract public and/or user’s tweets)</a:t>
-            </a:r>
-            <a:endParaRPr lang="en-US" dirty="0" smtClean="0"/>
+              <a:t>Twitter REST API (Extract public and/or user’s tweets)</a:t>
+            </a:r>
           </a:p>
           <a:p>
             <a:r>
@@ -9567,7 +9579,7 @@
           <a:blip r:embed="rId2">
             <a:extLst>
               <a:ext uri="{BEBA8EAE-BF5A-486C-A8C5-ECC9F3942E4B}">
-                <a14:imgProps xmlns="" xmlns:a14="http://schemas.microsoft.com/office/drawing/2010/main">
+                <a14:imgProps xmlns:a14="http://schemas.microsoft.com/office/drawing/2010/main">
                   <a14:imgLayer r:embed="rId3">
                     <a14:imgEffect>
                       <a14:backgroundRemoval t="4688" b="89941" l="10000" r="86563">
@@ -9596,7 +9608,7 @@
     </p:spTree>
     <p:extLst>
       <p:ext uri="{BB962C8B-B14F-4D97-AF65-F5344CB8AC3E}">
-        <p14:creationId xmlns="" xmlns:p14="http://schemas.microsoft.com/office/powerpoint/2010/main" val="2340456491"/>
+        <p14:creationId xmlns:p14="http://schemas.microsoft.com/office/powerpoint/2010/main" val="2340456491"/>
       </p:ext>
     </p:extLst>
   </p:cSld>
@@ -9642,7 +9654,7 @@
           <a:blip r:embed="rId2">
             <a:extLst>
               <a:ext uri="{BEBA8EAE-BF5A-486C-A8C5-ECC9F3942E4B}">
-                <a14:imgProps xmlns:a14="http://schemas.microsoft.com/office/drawing/2010/main" xmlns="">
+                <a14:imgProps xmlns:a14="http://schemas.microsoft.com/office/drawing/2010/main">
                   <a14:imgLayer r:embed="rId3">
                     <a14:imgEffect>
                       <a14:backgroundRemoval t="4688" b="89941" l="10000" r="86563">
@@ -9812,7 +9824,7 @@
     </p:spTree>
     <p:extLst>
       <p:ext uri="{BB962C8B-B14F-4D97-AF65-F5344CB8AC3E}">
-        <p14:creationId xmlns:p14="http://schemas.microsoft.com/office/powerpoint/2010/main" xmlns="" val="10880439"/>
+        <p14:creationId xmlns:p14="http://schemas.microsoft.com/office/powerpoint/2010/main" val="10880439"/>
       </p:ext>
     </p:extLst>
   </p:cSld>
@@ -9858,7 +9870,7 @@
           <a:blip r:embed="rId2">
             <a:extLst>
               <a:ext uri="{BEBA8EAE-BF5A-486C-A8C5-ECC9F3942E4B}">
-                <a14:imgProps xmlns:a14="http://schemas.microsoft.com/office/drawing/2010/main" xmlns="">
+                <a14:imgProps xmlns:a14="http://schemas.microsoft.com/office/drawing/2010/main">
                   <a14:imgLayer r:embed="rId3">
                     <a14:imgEffect>
                       <a14:backgroundRemoval t="4688" b="89941" l="10000" r="86563">
@@ -10032,7 +10044,7 @@
     </p:spTree>
     <p:extLst>
       <p:ext uri="{BB962C8B-B14F-4D97-AF65-F5344CB8AC3E}">
-        <p14:creationId xmlns:p14="http://schemas.microsoft.com/office/powerpoint/2010/main" xmlns="" val="10880439"/>
+        <p14:creationId xmlns:p14="http://schemas.microsoft.com/office/powerpoint/2010/main" val="10880439"/>
       </p:ext>
     </p:extLst>
   </p:cSld>
@@ -10078,7 +10090,7 @@
           <a:blip r:embed="rId2">
             <a:extLst>
               <a:ext uri="{28A0092B-C50C-407E-A947-70E740481C1C}">
-                <a14:useLocalDpi xmlns="" xmlns:a14="http://schemas.microsoft.com/office/drawing/2010/main" val="0"/>
+                <a14:useLocalDpi xmlns:a14="http://schemas.microsoft.com/office/drawing/2010/main" val="0"/>
               </a:ext>
             </a:extLst>
           </a:blip>
@@ -10215,7 +10227,7 @@
           <a:blip r:embed="rId3">
             <a:extLst>
               <a:ext uri="{BEBA8EAE-BF5A-486C-A8C5-ECC9F3942E4B}">
-                <a14:imgProps xmlns="" xmlns:a14="http://schemas.microsoft.com/office/drawing/2010/main">
+                <a14:imgProps xmlns:a14="http://schemas.microsoft.com/office/drawing/2010/main">
                   <a14:imgLayer r:embed="rId4">
                     <a14:imgEffect>
                       <a14:backgroundRemoval t="4688" b="89941" l="10000" r="86563">
@@ -10244,7 +10256,7 @@
     </p:spTree>
     <p:extLst>
       <p:ext uri="{BB962C8B-B14F-4D97-AF65-F5344CB8AC3E}">
-        <p14:creationId xmlns="" xmlns:p14="http://schemas.microsoft.com/office/powerpoint/2010/main" val="1422146805"/>
+        <p14:creationId xmlns:p14="http://schemas.microsoft.com/office/powerpoint/2010/main" val="1422146805"/>
       </p:ext>
     </p:extLst>
   </p:cSld>

</xml_diff>